<commit_message>
[ UPDATE ] 상단바 UI 수정
</commit_message>
<xml_diff>
--- a/문서/프로젝트 UI.pptx
+++ b/문서/프로젝트 UI.pptx
@@ -27,6 +27,7 @@
     <p:sldId id="273" r:id="rId21"/>
     <p:sldId id="281" r:id="rId22"/>
     <p:sldId id="275" r:id="rId23"/>
+    <p:sldId id="283" r:id="rId24"/>
   </p:sldIdLst>
   <p:sldSz cx="12192000" cy="6858000"/>
   <p:notesSz cx="6858000" cy="9144000"/>
@@ -262,7 +263,7 @@
           <a:p>
             <a:fld id="{F0E7B708-8D72-4D20-B763-42FE681C87D1}" type="datetimeFigureOut">
               <a:rPr lang="ko-KR" altLang="en-US" smtClean="0"/>
-              <a:t>2021-10-03</a:t>
+              <a:t>2021-10-07</a:t>
             </a:fld>
             <a:endParaRPr lang="ko-KR" altLang="en-US"/>
           </a:p>
@@ -430,7 +431,7 @@
           <a:p>
             <a:fld id="{F0E7B708-8D72-4D20-B763-42FE681C87D1}" type="datetimeFigureOut">
               <a:rPr lang="ko-KR" altLang="en-US" smtClean="0"/>
-              <a:t>2021-10-03</a:t>
+              <a:t>2021-10-07</a:t>
             </a:fld>
             <a:endParaRPr lang="ko-KR" altLang="en-US"/>
           </a:p>
@@ -608,7 +609,7 @@
           <a:p>
             <a:fld id="{F0E7B708-8D72-4D20-B763-42FE681C87D1}" type="datetimeFigureOut">
               <a:rPr lang="ko-KR" altLang="en-US" smtClean="0"/>
-              <a:t>2021-10-03</a:t>
+              <a:t>2021-10-07</a:t>
             </a:fld>
             <a:endParaRPr lang="ko-KR" altLang="en-US"/>
           </a:p>
@@ -776,7 +777,7 @@
           <a:p>
             <a:fld id="{F0E7B708-8D72-4D20-B763-42FE681C87D1}" type="datetimeFigureOut">
               <a:rPr lang="ko-KR" altLang="en-US" smtClean="0"/>
-              <a:t>2021-10-03</a:t>
+              <a:t>2021-10-07</a:t>
             </a:fld>
             <a:endParaRPr lang="ko-KR" altLang="en-US"/>
           </a:p>
@@ -1021,7 +1022,7 @@
           <a:p>
             <a:fld id="{F0E7B708-8D72-4D20-B763-42FE681C87D1}" type="datetimeFigureOut">
               <a:rPr lang="ko-KR" altLang="en-US" smtClean="0"/>
-              <a:t>2021-10-03</a:t>
+              <a:t>2021-10-07</a:t>
             </a:fld>
             <a:endParaRPr lang="ko-KR" altLang="en-US"/>
           </a:p>
@@ -1250,7 +1251,7 @@
           <a:p>
             <a:fld id="{F0E7B708-8D72-4D20-B763-42FE681C87D1}" type="datetimeFigureOut">
               <a:rPr lang="ko-KR" altLang="en-US" smtClean="0"/>
-              <a:t>2021-10-03</a:t>
+              <a:t>2021-10-07</a:t>
             </a:fld>
             <a:endParaRPr lang="ko-KR" altLang="en-US"/>
           </a:p>
@@ -1614,7 +1615,7 @@
           <a:p>
             <a:fld id="{F0E7B708-8D72-4D20-B763-42FE681C87D1}" type="datetimeFigureOut">
               <a:rPr lang="ko-KR" altLang="en-US" smtClean="0"/>
-              <a:t>2021-10-03</a:t>
+              <a:t>2021-10-07</a:t>
             </a:fld>
             <a:endParaRPr lang="ko-KR" altLang="en-US"/>
           </a:p>
@@ -1731,7 +1732,7 @@
           <a:p>
             <a:fld id="{F0E7B708-8D72-4D20-B763-42FE681C87D1}" type="datetimeFigureOut">
               <a:rPr lang="ko-KR" altLang="en-US" smtClean="0"/>
-              <a:t>2021-10-03</a:t>
+              <a:t>2021-10-07</a:t>
             </a:fld>
             <a:endParaRPr lang="ko-KR" altLang="en-US"/>
           </a:p>
@@ -1826,7 +1827,7 @@
           <a:p>
             <a:fld id="{F0E7B708-8D72-4D20-B763-42FE681C87D1}" type="datetimeFigureOut">
               <a:rPr lang="ko-KR" altLang="en-US" smtClean="0"/>
-              <a:t>2021-10-03</a:t>
+              <a:t>2021-10-07</a:t>
             </a:fld>
             <a:endParaRPr lang="ko-KR" altLang="en-US"/>
           </a:p>
@@ -2101,7 +2102,7 @@
           <a:p>
             <a:fld id="{F0E7B708-8D72-4D20-B763-42FE681C87D1}" type="datetimeFigureOut">
               <a:rPr lang="ko-KR" altLang="en-US" smtClean="0"/>
-              <a:t>2021-10-03</a:t>
+              <a:t>2021-10-07</a:t>
             </a:fld>
             <a:endParaRPr lang="ko-KR" altLang="en-US"/>
           </a:p>
@@ -2353,7 +2354,7 @@
           <a:p>
             <a:fld id="{F0E7B708-8D72-4D20-B763-42FE681C87D1}" type="datetimeFigureOut">
               <a:rPr lang="ko-KR" altLang="en-US" smtClean="0"/>
-              <a:t>2021-10-03</a:t>
+              <a:t>2021-10-07</a:t>
             </a:fld>
             <a:endParaRPr lang="ko-KR" altLang="en-US"/>
           </a:p>
@@ -2564,7 +2565,7 @@
           <a:p>
             <a:fld id="{F0E7B708-8D72-4D20-B763-42FE681C87D1}" type="datetimeFigureOut">
               <a:rPr lang="ko-KR" altLang="en-US" smtClean="0"/>
-              <a:t>2021-10-03</a:t>
+              <a:t>2021-10-07</a:t>
             </a:fld>
             <a:endParaRPr lang="ko-KR" altLang="en-US"/>
           </a:p>
@@ -24616,6 +24617,388 @@
 </p:sld>
 </file>
 
+<file path=ppt/slides/slide23.xml><?xml version="1.0" encoding="utf-8"?>
+<p:sld xmlns:a="http://schemas.openxmlformats.org/drawingml/2006/main" xmlns:r="http://schemas.openxmlformats.org/officeDocument/2006/relationships" xmlns:p="http://schemas.openxmlformats.org/presentationml/2006/main">
+  <p:cSld>
+    <p:spTree>
+      <p:nvGrpSpPr>
+        <p:cNvPr id="1" name=""/>
+        <p:cNvGrpSpPr/>
+        <p:nvPr/>
+      </p:nvGrpSpPr>
+      <p:grpSpPr>
+        <a:xfrm>
+          <a:off x="0" y="0"/>
+          <a:ext cx="0" cy="0"/>
+          <a:chOff x="0" y="0"/>
+          <a:chExt cx="0" cy="0"/>
+        </a:xfrm>
+      </p:grpSpPr>
+      <p:sp>
+        <p:nvSpPr>
+          <p:cNvPr id="5" name="직사각형 4">
+            <a:extLst>
+              <a:ext uri="{FF2B5EF4-FFF2-40B4-BE49-F238E27FC236}">
+                <a16:creationId xmlns:a16="http://schemas.microsoft.com/office/drawing/2014/main" id="{D01AD6F5-1360-4EFF-A685-BADDAEEEF348}"/>
+              </a:ext>
+            </a:extLst>
+          </p:cNvPr>
+          <p:cNvSpPr/>
+          <p:nvPr/>
+        </p:nvSpPr>
+        <p:spPr>
+          <a:xfrm>
+            <a:off x="402671" y="1675701"/>
+            <a:ext cx="3212984" cy="3743588"/>
+          </a:xfrm>
+          <a:prstGeom prst="rect">
+            <a:avLst/>
+          </a:prstGeom>
+        </p:spPr>
+        <p:style>
+          <a:lnRef idx="2">
+            <a:schemeClr val="accent3"/>
+          </a:lnRef>
+          <a:fillRef idx="1">
+            <a:schemeClr val="lt1"/>
+          </a:fillRef>
+          <a:effectRef idx="0">
+            <a:schemeClr val="accent3"/>
+          </a:effectRef>
+          <a:fontRef idx="minor">
+            <a:schemeClr val="dk1"/>
+          </a:fontRef>
+        </p:style>
+        <p:txBody>
+          <a:bodyPr rtlCol="0" anchor="ctr"/>
+          <a:lstStyle/>
+          <a:p>
+            <a:pPr algn="ctr"/>
+            <a:endParaRPr lang="ko-KR" altLang="en-US"/>
+          </a:p>
+        </p:txBody>
+      </p:sp>
+      <p:sp>
+        <p:nvSpPr>
+          <p:cNvPr id="6" name="직사각형 5">
+            <a:extLst>
+              <a:ext uri="{FF2B5EF4-FFF2-40B4-BE49-F238E27FC236}">
+                <a16:creationId xmlns:a16="http://schemas.microsoft.com/office/drawing/2014/main" id="{CA2DC0E8-04B7-4DA6-8995-EF553676AAD7}"/>
+              </a:ext>
+            </a:extLst>
+          </p:cNvPr>
+          <p:cNvSpPr/>
+          <p:nvPr/>
+        </p:nvSpPr>
+        <p:spPr>
+          <a:xfrm>
+            <a:off x="645952" y="1996580"/>
+            <a:ext cx="2676087" cy="2474752"/>
+          </a:xfrm>
+          <a:prstGeom prst="rect">
+            <a:avLst/>
+          </a:prstGeom>
+        </p:spPr>
+        <p:style>
+          <a:lnRef idx="1">
+            <a:schemeClr val="accent3"/>
+          </a:lnRef>
+          <a:fillRef idx="2">
+            <a:schemeClr val="accent3"/>
+          </a:fillRef>
+          <a:effectRef idx="1">
+            <a:schemeClr val="accent3"/>
+          </a:effectRef>
+          <a:fontRef idx="minor">
+            <a:schemeClr val="dk1"/>
+          </a:fontRef>
+        </p:style>
+        <p:txBody>
+          <a:bodyPr rtlCol="0" anchor="ctr"/>
+          <a:lstStyle/>
+          <a:p>
+            <a:pPr algn="ctr"/>
+            <a:endParaRPr lang="ko-KR" altLang="en-US"/>
+          </a:p>
+        </p:txBody>
+      </p:sp>
+      <p:sp>
+        <p:nvSpPr>
+          <p:cNvPr id="7" name="직사각형 6">
+            <a:extLst>
+              <a:ext uri="{FF2B5EF4-FFF2-40B4-BE49-F238E27FC236}">
+                <a16:creationId xmlns:a16="http://schemas.microsoft.com/office/drawing/2014/main" id="{E8CA7321-B3D9-47E1-A9A8-672B9475B1A2}"/>
+              </a:ext>
+            </a:extLst>
+          </p:cNvPr>
+          <p:cNvSpPr/>
+          <p:nvPr/>
+        </p:nvSpPr>
+        <p:spPr>
+          <a:xfrm>
+            <a:off x="4514675" y="1675701"/>
+            <a:ext cx="3212984" cy="3743588"/>
+          </a:xfrm>
+          <a:prstGeom prst="rect">
+            <a:avLst/>
+          </a:prstGeom>
+        </p:spPr>
+        <p:style>
+          <a:lnRef idx="2">
+            <a:schemeClr val="accent3"/>
+          </a:lnRef>
+          <a:fillRef idx="1">
+            <a:schemeClr val="lt1"/>
+          </a:fillRef>
+          <a:effectRef idx="0">
+            <a:schemeClr val="accent3"/>
+          </a:effectRef>
+          <a:fontRef idx="minor">
+            <a:schemeClr val="dk1"/>
+          </a:fontRef>
+        </p:style>
+        <p:txBody>
+          <a:bodyPr rtlCol="0" anchor="ctr"/>
+          <a:lstStyle/>
+          <a:p>
+            <a:pPr algn="ctr"/>
+            <a:endParaRPr lang="ko-KR" altLang="en-US"/>
+          </a:p>
+        </p:txBody>
+      </p:sp>
+      <p:sp>
+        <p:nvSpPr>
+          <p:cNvPr id="8" name="직사각형 7">
+            <a:extLst>
+              <a:ext uri="{FF2B5EF4-FFF2-40B4-BE49-F238E27FC236}">
+                <a16:creationId xmlns:a16="http://schemas.microsoft.com/office/drawing/2014/main" id="{B3098740-625E-4443-8052-8F252C2F76B3}"/>
+              </a:ext>
+            </a:extLst>
+          </p:cNvPr>
+          <p:cNvSpPr/>
+          <p:nvPr/>
+        </p:nvSpPr>
+        <p:spPr>
+          <a:xfrm>
+            <a:off x="4757956" y="1996580"/>
+            <a:ext cx="2676087" cy="2474752"/>
+          </a:xfrm>
+          <a:prstGeom prst="rect">
+            <a:avLst/>
+          </a:prstGeom>
+        </p:spPr>
+        <p:style>
+          <a:lnRef idx="1">
+            <a:schemeClr val="accent3"/>
+          </a:lnRef>
+          <a:fillRef idx="2">
+            <a:schemeClr val="accent3"/>
+          </a:fillRef>
+          <a:effectRef idx="1">
+            <a:schemeClr val="accent3"/>
+          </a:effectRef>
+          <a:fontRef idx="minor">
+            <a:schemeClr val="dk1"/>
+          </a:fontRef>
+        </p:style>
+        <p:txBody>
+          <a:bodyPr rtlCol="0" anchor="ctr"/>
+          <a:lstStyle/>
+          <a:p>
+            <a:pPr algn="ctr"/>
+            <a:endParaRPr lang="ko-KR" altLang="en-US"/>
+          </a:p>
+        </p:txBody>
+      </p:sp>
+      <p:sp>
+        <p:nvSpPr>
+          <p:cNvPr id="13" name="직사각형 12">
+            <a:extLst>
+              <a:ext uri="{FF2B5EF4-FFF2-40B4-BE49-F238E27FC236}">
+                <a16:creationId xmlns:a16="http://schemas.microsoft.com/office/drawing/2014/main" id="{2B6E6F47-F1FB-456D-915C-2DDE7068BBD8}"/>
+              </a:ext>
+            </a:extLst>
+          </p:cNvPr>
+          <p:cNvSpPr/>
+          <p:nvPr/>
+        </p:nvSpPr>
+        <p:spPr>
+          <a:xfrm>
+            <a:off x="8626679" y="1675701"/>
+            <a:ext cx="3212984" cy="3743588"/>
+          </a:xfrm>
+          <a:prstGeom prst="rect">
+            <a:avLst/>
+          </a:prstGeom>
+        </p:spPr>
+        <p:style>
+          <a:lnRef idx="2">
+            <a:schemeClr val="accent3"/>
+          </a:lnRef>
+          <a:fillRef idx="1">
+            <a:schemeClr val="lt1"/>
+          </a:fillRef>
+          <a:effectRef idx="0">
+            <a:schemeClr val="accent3"/>
+          </a:effectRef>
+          <a:fontRef idx="minor">
+            <a:schemeClr val="dk1"/>
+          </a:fontRef>
+        </p:style>
+        <p:txBody>
+          <a:bodyPr rtlCol="0" anchor="ctr"/>
+          <a:lstStyle/>
+          <a:p>
+            <a:pPr algn="ctr"/>
+            <a:endParaRPr lang="ko-KR" altLang="en-US"/>
+          </a:p>
+        </p:txBody>
+      </p:sp>
+      <p:sp>
+        <p:nvSpPr>
+          <p:cNvPr id="14" name="직사각형 13">
+            <a:extLst>
+              <a:ext uri="{FF2B5EF4-FFF2-40B4-BE49-F238E27FC236}">
+                <a16:creationId xmlns:a16="http://schemas.microsoft.com/office/drawing/2014/main" id="{34D60054-7FAD-4EC5-AA97-C02EFA1BD1B9}"/>
+              </a:ext>
+            </a:extLst>
+          </p:cNvPr>
+          <p:cNvSpPr/>
+          <p:nvPr/>
+        </p:nvSpPr>
+        <p:spPr>
+          <a:xfrm>
+            <a:off x="8869960" y="1996580"/>
+            <a:ext cx="2676087" cy="2474752"/>
+          </a:xfrm>
+          <a:prstGeom prst="rect">
+            <a:avLst/>
+          </a:prstGeom>
+        </p:spPr>
+        <p:style>
+          <a:lnRef idx="1">
+            <a:schemeClr val="accent3"/>
+          </a:lnRef>
+          <a:fillRef idx="2">
+            <a:schemeClr val="accent3"/>
+          </a:fillRef>
+          <a:effectRef idx="1">
+            <a:schemeClr val="accent3"/>
+          </a:effectRef>
+          <a:fontRef idx="minor">
+            <a:schemeClr val="dk1"/>
+          </a:fontRef>
+        </p:style>
+        <p:txBody>
+          <a:bodyPr rtlCol="0" anchor="ctr"/>
+          <a:lstStyle/>
+          <a:p>
+            <a:pPr algn="ctr"/>
+            <a:endParaRPr lang="ko-KR" altLang="en-US"/>
+          </a:p>
+        </p:txBody>
+      </p:sp>
+      <p:sp>
+        <p:nvSpPr>
+          <p:cNvPr id="15" name="직사각형 14">
+            <a:extLst>
+              <a:ext uri="{FF2B5EF4-FFF2-40B4-BE49-F238E27FC236}">
+                <a16:creationId xmlns:a16="http://schemas.microsoft.com/office/drawing/2014/main" id="{5EC28312-A0BC-4309-A9CE-EA18C67CADB5}"/>
+              </a:ext>
+            </a:extLst>
+          </p:cNvPr>
+          <p:cNvSpPr/>
+          <p:nvPr/>
+        </p:nvSpPr>
+        <p:spPr>
+          <a:xfrm>
+            <a:off x="3103926" y="423639"/>
+            <a:ext cx="1023457" cy="362825"/>
+          </a:xfrm>
+          <a:prstGeom prst="rect">
+            <a:avLst/>
+          </a:prstGeom>
+        </p:spPr>
+        <p:style>
+          <a:lnRef idx="2">
+            <a:schemeClr val="accent3"/>
+          </a:lnRef>
+          <a:fillRef idx="1">
+            <a:schemeClr val="lt1"/>
+          </a:fillRef>
+          <a:effectRef idx="0">
+            <a:schemeClr val="accent3"/>
+          </a:effectRef>
+          <a:fontRef idx="minor">
+            <a:schemeClr val="dk1"/>
+          </a:fontRef>
+        </p:style>
+        <p:txBody>
+          <a:bodyPr rtlCol="0" anchor="ctr"/>
+          <a:lstStyle/>
+          <a:p>
+            <a:pPr algn="ctr"/>
+            <a:endParaRPr lang="ko-KR" altLang="en-US"/>
+          </a:p>
+        </p:txBody>
+      </p:sp>
+      <p:sp>
+        <p:nvSpPr>
+          <p:cNvPr id="17" name="직사각형 16">
+            <a:extLst>
+              <a:ext uri="{FF2B5EF4-FFF2-40B4-BE49-F238E27FC236}">
+                <a16:creationId xmlns:a16="http://schemas.microsoft.com/office/drawing/2014/main" id="{AACE857B-5566-4E19-B1CE-86964B53147E}"/>
+              </a:ext>
+            </a:extLst>
+          </p:cNvPr>
+          <p:cNvSpPr/>
+          <p:nvPr/>
+        </p:nvSpPr>
+        <p:spPr>
+          <a:xfrm>
+            <a:off x="4420999" y="423639"/>
+            <a:ext cx="4205680" cy="362825"/>
+          </a:xfrm>
+          <a:prstGeom prst="rect">
+            <a:avLst/>
+          </a:prstGeom>
+        </p:spPr>
+        <p:style>
+          <a:lnRef idx="2">
+            <a:schemeClr val="accent3"/>
+          </a:lnRef>
+          <a:fillRef idx="1">
+            <a:schemeClr val="lt1"/>
+          </a:fillRef>
+          <a:effectRef idx="0">
+            <a:schemeClr val="accent3"/>
+          </a:effectRef>
+          <a:fontRef idx="minor">
+            <a:schemeClr val="dk1"/>
+          </a:fontRef>
+        </p:style>
+        <p:txBody>
+          <a:bodyPr rtlCol="0" anchor="ctr"/>
+          <a:lstStyle/>
+          <a:p>
+            <a:pPr algn="ctr"/>
+            <a:endParaRPr lang="ko-KR" altLang="en-US"/>
+          </a:p>
+        </p:txBody>
+      </p:sp>
+    </p:spTree>
+    <p:extLst>
+      <p:ext uri="{BB962C8B-B14F-4D97-AF65-F5344CB8AC3E}">
+        <p14:creationId xmlns:p14="http://schemas.microsoft.com/office/powerpoint/2010/main" val="3337024324"/>
+      </p:ext>
+    </p:extLst>
+  </p:cSld>
+  <p:clrMapOvr>
+    <a:masterClrMapping/>
+  </p:clrMapOvr>
+</p:sld>
+</file>
+
 <file path=ppt/slides/slide3.xml><?xml version="1.0" encoding="utf-8"?>
 <p:sld xmlns:a="http://schemas.openxmlformats.org/drawingml/2006/main" xmlns:r="http://schemas.openxmlformats.org/officeDocument/2006/relationships" xmlns:p="http://schemas.openxmlformats.org/presentationml/2006/main">
   <p:cSld>

</xml_diff>